<commit_message>
consistent with other versions
</commit_message>
<xml_diff>
--- a/powerpoint/templates/VirtualPrivateCloudEditablePPT.pptx
+++ b/powerpoint/templates/VirtualPrivateCloudEditablePPT.pptx
@@ -3830,10 +3830,10 @@
         </p:nvGrpSpPr>
         <p:grpSpPr>
           <a:xfrm>
-            <a:off x="91440" y="177142"/>
-            <a:ext cx="9913576" cy="7418116"/>
-            <a:chOff x="72412" y="587959"/>
-            <a:chExt cx="9913576" cy="7418116"/>
+            <a:off x="81510" y="177142"/>
+            <a:ext cx="9923506" cy="7418116"/>
+            <a:chOff x="62482" y="587959"/>
+            <a:chExt cx="9923506" cy="7418116"/>
           </a:xfrm>
         </p:grpSpPr>
         <p:grpSp>
@@ -3850,10 +3850,10 @@
           </p:nvGrpSpPr>
           <p:grpSpPr>
             <a:xfrm>
-              <a:off x="72412" y="587959"/>
-              <a:ext cx="9913576" cy="7418116"/>
-              <a:chOff x="0" y="177142"/>
-              <a:chExt cx="9913576" cy="7418116"/>
+              <a:off x="62482" y="587959"/>
+              <a:ext cx="9923506" cy="7418116"/>
+              <a:chOff x="-9930" y="177142"/>
+              <a:chExt cx="9923506" cy="7418116"/>
             </a:xfrm>
           </p:grpSpPr>
           <p:grpSp>
@@ -3870,10 +3870,10 @@
             </p:nvGrpSpPr>
             <p:grpSpPr>
               <a:xfrm>
-                <a:off x="0" y="177142"/>
-                <a:ext cx="9913576" cy="7418116"/>
-                <a:chOff x="104797" y="155522"/>
-                <a:chExt cx="9913576" cy="7418116"/>
+                <a:off x="-9930" y="177142"/>
+                <a:ext cx="9923506" cy="7418116"/>
+                <a:chOff x="94867" y="155522"/>
+                <a:chExt cx="9923506" cy="7418116"/>
               </a:xfrm>
             </p:grpSpPr>
             <p:cxnSp>
@@ -3899,14 +3899,14 @@
                   <a:avLst/>
                 </a:prstGeom>
                 <a:noFill/>
-                <a:ln w="25400" cap="flat">
+                <a:ln w="12700" cap="flat">
                   <a:solidFill>
                     <a:schemeClr val="tx1"/>
                   </a:solidFill>
                   <a:prstDash val="solid"/>
                   <a:miter lim="400000"/>
-                  <a:headEnd type="triangle" w="lg" len="med"/>
-                  <a:tailEnd type="triangle" w="lg" len="med"/>
+                  <a:headEnd type="stealth" w="lg" len="med"/>
+                  <a:tailEnd type="stealth" w="lg" len="med"/>
                 </a:ln>
                 <a:effectLst/>
               </p:spPr>
@@ -4398,14 +4398,14 @@
                   <a:avLst/>
                 </a:prstGeom>
                 <a:noFill/>
-                <a:ln w="25400" cap="flat">
+                <a:ln w="12700" cap="flat">
                   <a:solidFill>
                     <a:schemeClr val="tx1"/>
                   </a:solidFill>
                   <a:prstDash val="solid"/>
                   <a:miter lim="400000"/>
                   <a:headEnd type="none" w="lg" len="med"/>
-                  <a:tailEnd type="triangle" w="lg" len="med"/>
+                  <a:tailEnd type="stealth" w="lg" len="med"/>
                 </a:ln>
                 <a:effectLst/>
               </p:spPr>
@@ -5174,21 +5174,21 @@
               </p:nvCxnSpPr>
               <p:spPr>
                 <a:xfrm>
-                  <a:off x="685536" y="3437475"/>
-                  <a:ext cx="0" cy="474997"/>
+                  <a:off x="690387" y="3247138"/>
+                  <a:ext cx="3800" cy="707872"/>
                 </a:xfrm>
                 <a:prstGeom prst="straightConnector1">
                   <a:avLst/>
                 </a:prstGeom>
                 <a:noFill/>
-                <a:ln w="25400" cap="flat">
+                <a:ln w="12700" cap="flat">
                   <a:solidFill>
                     <a:schemeClr val="tx1"/>
                   </a:solidFill>
                   <a:prstDash val="solid"/>
                   <a:miter lim="400000"/>
-                  <a:headEnd type="triangle" w="lg" len="med"/>
-                  <a:tailEnd type="triangle" w="lg" len="med"/>
+                  <a:headEnd type="stealth" w="lg" len="med"/>
+                  <a:tailEnd type="stealth" w="lg" len="med"/>
                 </a:ln>
                 <a:effectLst/>
               </p:spPr>
@@ -5228,14 +5228,14 @@
                   <a:avLst/>
                 </a:prstGeom>
                 <a:noFill/>
-                <a:ln w="25400" cap="flat">
+                <a:ln w="12700" cap="flat">
                   <a:solidFill>
                     <a:schemeClr val="tx1"/>
                   </a:solidFill>
                   <a:prstDash val="solid"/>
                   <a:miter lim="400000"/>
-                  <a:headEnd type="triangle" w="lg" len="med"/>
-                  <a:tailEnd type="triangle" w="lg" len="med"/>
+                  <a:headEnd type="stealth" w="lg" len="med"/>
+                  <a:tailEnd type="stealth" w="lg" len="med"/>
                 </a:ln>
                 <a:effectLst/>
               </p:spPr>
@@ -5275,14 +5275,14 @@
                   <a:avLst/>
                 </a:prstGeom>
                 <a:noFill/>
-                <a:ln w="25400" cap="flat">
+                <a:ln w="12700" cap="flat">
                   <a:solidFill>
                     <a:schemeClr val="tx1"/>
                   </a:solidFill>
                   <a:prstDash val="solid"/>
                   <a:miter lim="400000"/>
-                  <a:headEnd type="triangle" w="lg" len="med"/>
-                  <a:tailEnd type="triangle" w="lg" len="med"/>
+                  <a:headEnd type="stealth" w="lg" len="med"/>
+                  <a:tailEnd type="stealth" w="lg" len="med"/>
                 </a:ln>
                 <a:effectLst/>
               </p:spPr>
@@ -5313,10 +5313,10 @@
               </p:nvGrpSpPr>
               <p:grpSpPr>
                 <a:xfrm>
-                  <a:off x="1461684" y="682417"/>
-                  <a:ext cx="7144721" cy="6767805"/>
-                  <a:chOff x="246534" y="4843879"/>
-                  <a:chExt cx="1615242" cy="1716469"/>
+                  <a:off x="1461684" y="694908"/>
+                  <a:ext cx="7144721" cy="6755314"/>
+                  <a:chOff x="246534" y="4847047"/>
+                  <a:chExt cx="1615242" cy="1713301"/>
                 </a:xfrm>
               </p:grpSpPr>
               <p:sp>
@@ -5405,7 +5405,7 @@
                 </p:nvSpPr>
                 <p:spPr>
                   <a:xfrm>
-                    <a:off x="357474" y="4843879"/>
+                    <a:off x="341245" y="4849198"/>
                     <a:ext cx="310974" cy="74190"/>
                   </a:xfrm>
                   <a:prstGeom prst="rect">
@@ -5467,10 +5467,10 @@
               </p:nvGrpSpPr>
               <p:grpSpPr>
                 <a:xfrm>
-                  <a:off x="144607" y="155522"/>
-                  <a:ext cx="9819178" cy="7418116"/>
-                  <a:chOff x="-64434" y="-13543"/>
-                  <a:chExt cx="10014173" cy="7714986"/>
+                  <a:off x="155418" y="155522"/>
+                  <a:ext cx="9738299" cy="7418116"/>
+                  <a:chOff x="-53408" y="-13543"/>
+                  <a:chExt cx="9931687" cy="7714986"/>
                 </a:xfrm>
               </p:grpSpPr>
               <p:sp>
@@ -5487,8 +5487,8 @@
                 </p:nvSpPr>
                 <p:spPr>
                   <a:xfrm>
-                    <a:off x="9192810" y="52681"/>
-                    <a:ext cx="756929" cy="382344"/>
+                    <a:off x="9165491" y="55430"/>
+                    <a:ext cx="712788" cy="384113"/>
                   </a:xfrm>
                   <a:prstGeom prst="rect">
                     <a:avLst/>
@@ -5533,7 +5533,7 @@
                           <a:schemeClr val="tx1"/>
                         </a:solidFill>
                       </a:rPr>
-                      <a:t>Enterprise </a:t>
+                      <a:t>Enterprise</a:t>
                     </a:r>
                   </a:p>
                   <a:p>
@@ -5574,7 +5574,7 @@
                 </p:nvSpPr>
                 <p:spPr>
                   <a:xfrm>
-                    <a:off x="430182" y="58926"/>
+                    <a:off x="364335" y="58926"/>
                     <a:ext cx="572965" cy="376100"/>
                   </a:xfrm>
                   <a:prstGeom prst="rect">
@@ -5670,7 +5670,7 @@
                     </a:avLst>
                   </a:prstGeom>
                   <a:noFill/>
-                  <a:ln w="25400">
+                  <a:ln w="38100">
                     <a:solidFill>
                       <a:srgbClr val="4378BB"/>
                     </a:solidFill>
@@ -5732,7 +5732,7 @@
                 </p:nvSpPr>
                 <p:spPr>
                   <a:xfrm>
-                    <a:off x="1645766" y="-13543"/>
+                    <a:off x="1561697" y="21132"/>
                     <a:ext cx="949096" cy="287258"/>
                   </a:xfrm>
                   <a:prstGeom prst="rect">
@@ -5801,8 +5801,8 @@
                 </p:blipFill>
                 <p:spPr>
                   <a:xfrm>
-                    <a:off x="8762754" y="55289"/>
-                    <a:ext cx="414259" cy="379737"/>
+                    <a:off x="8762754" y="55290"/>
+                    <a:ext cx="370030" cy="339194"/>
                   </a:xfrm>
                   <a:prstGeom prst="rect">
                     <a:avLst/>
@@ -5831,8 +5831,8 @@
                 </p:blipFill>
                 <p:spPr>
                   <a:xfrm>
-                    <a:off x="-64434" y="20731"/>
-                    <a:ext cx="400522" cy="367145"/>
+                    <a:off x="-53408" y="42848"/>
+                    <a:ext cx="385192" cy="353093"/>
                   </a:xfrm>
                   <a:prstGeom prst="rect">
                     <a:avLst/>
@@ -5862,7 +5862,7 @@
                 <p:spPr>
                   <a:xfrm>
                     <a:off x="1207307" y="26928"/>
-                    <a:ext cx="398479" cy="365272"/>
+                    <a:ext cx="378433" cy="346895"/>
                   </a:xfrm>
                   <a:prstGeom prst="rect">
                     <a:avLst/>
@@ -5884,10 +5884,10 @@
               </p:nvGrpSpPr>
               <p:grpSpPr>
                 <a:xfrm>
-                  <a:off x="401796" y="2622494"/>
-                  <a:ext cx="682482" cy="747952"/>
-                  <a:chOff x="61579" y="2403334"/>
-                  <a:chExt cx="682482" cy="747952"/>
+                  <a:off x="402857" y="2622494"/>
+                  <a:ext cx="682482" cy="705904"/>
+                  <a:chOff x="62640" y="2403334"/>
+                  <a:chExt cx="682482" cy="705904"/>
                 </a:xfrm>
               </p:grpSpPr>
               <p:sp>
@@ -5904,7 +5904,7 @@
                 </p:nvSpPr>
                 <p:spPr>
                   <a:xfrm>
-                    <a:off x="61579" y="2864028"/>
+                    <a:off x="62640" y="2821980"/>
                     <a:ext cx="682482" cy="287258"/>
                   </a:xfrm>
                   <a:prstGeom prst="rect">
@@ -6013,8 +6013,8 @@
               </p:blipFill>
               <p:spPr>
                 <a:xfrm>
-                  <a:off x="1491747" y="719429"/>
-                  <a:ext cx="424249" cy="379591"/>
+                  <a:off x="1491748" y="719430"/>
+                  <a:ext cx="388874" cy="347940"/>
                 </a:xfrm>
                 <a:prstGeom prst="rect">
                   <a:avLst/>
@@ -6035,7 +6035,7 @@
               </p:nvSpPr>
               <p:spPr>
                 <a:xfrm>
-                  <a:off x="104797" y="159445"/>
+                  <a:off x="94867" y="159445"/>
                   <a:ext cx="1231896" cy="7413260"/>
                 </a:xfrm>
                 <a:prstGeom prst="roundRect">
@@ -6044,7 +6044,7 @@
                   </a:avLst>
                 </a:prstGeom>
                 <a:noFill/>
-                <a:ln w="25400">
+                <a:ln w="38100">
                   <a:solidFill>
                     <a:srgbClr val="4378BB"/>
                   </a:solidFill>
@@ -6112,10 +6112,10 @@
               </p:nvGrpSpPr>
               <p:grpSpPr>
                 <a:xfrm>
-                  <a:off x="1607118" y="1202778"/>
-                  <a:ext cx="7507245" cy="6143771"/>
-                  <a:chOff x="1520451" y="1143287"/>
-                  <a:chExt cx="7507245" cy="6143771"/>
+                  <a:off x="1607118" y="1215635"/>
+                  <a:ext cx="7507245" cy="6130914"/>
+                  <a:chOff x="1520451" y="1156144"/>
+                  <a:chExt cx="7507245" cy="6130914"/>
                 </a:xfrm>
               </p:grpSpPr>
               <p:sp>
@@ -6143,7 +6143,7 @@
                   <a:solidFill>
                     <a:srgbClr val="E0E0E0"/>
                   </a:solidFill>
-                  <a:ln w="25400">
+                  <a:ln w="12700">
                     <a:solidFill>
                       <a:srgbClr val="919191"/>
                     </a:solidFill>
@@ -6420,7 +6420,7 @@
                     <a:solidFill>
                       <a:srgbClr val="E6F0E2"/>
                     </a:solidFill>
-                    <a:ln w="25400">
+                    <a:ln w="12700">
                       <a:solidFill>
                         <a:srgbClr val="00882B"/>
                       </a:solidFill>
@@ -6491,7 +6491,7 @@
                   <p:spPr>
                     <a:xfrm>
                       <a:off x="5052750" y="2111472"/>
-                      <a:ext cx="391872" cy="359216"/>
+                      <a:ext cx="362280" cy="332090"/>
                     </a:xfrm>
                     <a:prstGeom prst="rect">
                       <a:avLst/>
@@ -6513,10 +6513,10 @@
                 </p:nvGrpSpPr>
                 <p:grpSpPr>
                   <a:xfrm>
-                    <a:off x="1654687" y="1629787"/>
-                    <a:ext cx="2555431" cy="5475498"/>
-                    <a:chOff x="1625233" y="1436604"/>
-                    <a:chExt cx="2555431" cy="5475498"/>
+                    <a:off x="1654818" y="1628068"/>
+                    <a:ext cx="2555431" cy="5514402"/>
+                    <a:chOff x="1625364" y="1434885"/>
+                    <a:chExt cx="2555431" cy="5514402"/>
                   </a:xfrm>
                 </p:grpSpPr>
                 <p:sp>
@@ -6533,7 +6533,7 @@
                   </p:nvSpPr>
                   <p:spPr>
                     <a:xfrm>
-                      <a:off x="1625233" y="1436604"/>
+                      <a:off x="1625364" y="1473789"/>
                       <a:ext cx="2555431" cy="5475498"/>
                     </a:xfrm>
                     <a:prstGeom prst="roundRect">
@@ -6544,7 +6544,7 @@
                     <a:solidFill>
                       <a:srgbClr val="E0E0E0"/>
                     </a:solidFill>
-                    <a:ln w="25400">
+                    <a:ln w="12700">
                       <a:solidFill>
                         <a:srgbClr val="919191"/>
                       </a:solidFill>
@@ -6607,7 +6607,7 @@
                   </p:nvSpPr>
                   <p:spPr>
                     <a:xfrm>
-                      <a:off x="2183830" y="1445228"/>
+                      <a:off x="2014274" y="1434885"/>
                       <a:ext cx="1936074" cy="480571"/>
                     </a:xfrm>
                     <a:prstGeom prst="rect">
@@ -6713,7 +6713,7 @@
                     <a:solidFill>
                       <a:srgbClr val="E6F9E2"/>
                     </a:solidFill>
-                    <a:ln w="25400">
+                    <a:ln w="12700">
                       <a:solidFill>
                         <a:srgbClr val="00882B"/>
                       </a:solidFill>
@@ -6857,7 +6857,7 @@
                   <p:spPr>
                     <a:xfrm>
                       <a:off x="2609880" y="2168062"/>
-                      <a:ext cx="391872" cy="359216"/>
+                      <a:ext cx="358576" cy="328695"/>
                     </a:xfrm>
                     <a:prstGeom prst="rect">
                       <a:avLst/>
@@ -6910,7 +6910,7 @@
                     <a:solidFill>
                       <a:srgbClr val="E6F0E2"/>
                     </a:solidFill>
-                    <a:ln w="25400">
+                    <a:ln w="12700">
                       <a:solidFill>
                         <a:srgbClr val="00882B"/>
                       </a:solidFill>
@@ -7053,8 +7053,8 @@
                   </p:blipFill>
                   <p:spPr>
                     <a:xfrm>
-                      <a:off x="5061816" y="4903391"/>
-                      <a:ext cx="405904" cy="372079"/>
+                      <a:off x="5061816" y="4903392"/>
+                      <a:ext cx="375030" cy="343778"/>
                     </a:xfrm>
                     <a:prstGeom prst="rect">
                       <a:avLst/>
@@ -7107,7 +7107,7 @@
                     <a:solidFill>
                       <a:srgbClr val="E6F0E2"/>
                     </a:solidFill>
-                    <a:ln w="25400">
+                    <a:ln w="12700">
                       <a:solidFill>
                         <a:srgbClr val="00882B"/>
                       </a:solidFill>
@@ -7251,7 +7251,7 @@
                   <p:spPr>
                     <a:xfrm>
                       <a:off x="2586395" y="4909629"/>
-                      <a:ext cx="405904" cy="372079"/>
+                      <a:ext cx="387271" cy="354999"/>
                     </a:xfrm>
                     <a:prstGeom prst="rect">
                       <a:avLst/>
@@ -7273,8 +7273,8 @@
                 </p:nvSpPr>
                 <p:spPr>
                   <a:xfrm>
-                    <a:off x="7134636" y="1652416"/>
-                    <a:ext cx="1130650" cy="2999879"/>
+                    <a:off x="7134636" y="1652417"/>
+                    <a:ext cx="1130650" cy="2948326"/>
                   </a:xfrm>
                   <a:prstGeom prst="roundRect">
                     <a:avLst>
@@ -7284,7 +7284,7 @@
                   <a:solidFill>
                     <a:srgbClr val="E0E0E0"/>
                   </a:solidFill>
-                  <a:ln w="25400">
+                  <a:ln w="12700">
                     <a:solidFill>
                       <a:srgbClr val="919191"/>
                     </a:solidFill>
@@ -7356,7 +7356,7 @@
                     <a:avLst/>
                   </a:prstGeom>
                   <a:noFill/>
-                  <a:ln w="25400" cap="flat">
+                  <a:ln w="12700" cap="flat">
                     <a:solidFill>
                       <a:schemeClr val="tx1"/>
                     </a:solidFill>
@@ -7403,7 +7403,7 @@
                     <a:avLst/>
                   </a:prstGeom>
                   <a:noFill/>
-                  <a:ln w="25400" cap="flat">
+                  <a:ln w="12700" cap="flat">
                     <a:solidFill>
                       <a:schemeClr val="tx1"/>
                     </a:solidFill>
@@ -7450,7 +7450,7 @@
                     <a:avLst/>
                   </a:prstGeom>
                   <a:noFill/>
-                  <a:ln w="25400" cap="flat">
+                  <a:ln w="12700" cap="flat">
                     <a:solidFill>
                       <a:schemeClr val="tx1"/>
                     </a:solidFill>
@@ -7497,13 +7497,13 @@
                     <a:avLst/>
                   </a:prstGeom>
                   <a:noFill/>
-                  <a:ln w="25400" cap="flat">
+                  <a:ln w="12700" cap="flat">
                     <a:solidFill>
                       <a:schemeClr val="tx1"/>
                     </a:solidFill>
                     <a:prstDash val="solid"/>
                     <a:miter lim="400000"/>
-                    <a:headEnd type="triangle" w="lg" len="med"/>
+                    <a:headEnd type="stealth" w="lg" len="med"/>
                     <a:tailEnd type="none" w="lg" len="med"/>
                   </a:ln>
                   <a:effectLst/>
@@ -7615,21 +7615,21 @@
                 </p:nvCxnSpPr>
                 <p:spPr>
                   <a:xfrm>
-                    <a:off x="7628663" y="5979742"/>
-                    <a:ext cx="0" cy="301432"/>
+                    <a:off x="7680695" y="5648326"/>
+                    <a:ext cx="0" cy="482132"/>
                   </a:xfrm>
                   <a:prstGeom prst="straightConnector1">
                     <a:avLst/>
                   </a:prstGeom>
                   <a:noFill/>
-                  <a:ln w="25400" cap="flat">
+                  <a:ln w="12700" cap="flat">
                     <a:solidFill>
                       <a:schemeClr val="tx1"/>
                     </a:solidFill>
                     <a:prstDash val="solid"/>
                     <a:miter lim="400000"/>
-                    <a:headEnd type="triangle" w="lg" len="med"/>
-                    <a:tailEnd type="triangle" w="lg" len="med"/>
+                    <a:headEnd type="stealth" w="lg" len="med"/>
+                    <a:tailEnd type="stealth" w="lg" len="med"/>
                   </a:ln>
                   <a:effectLst/>
                 </p:spPr>
@@ -7660,7 +7660,7 @@
                 </p:nvSpPr>
                 <p:spPr>
                   <a:xfrm>
-                    <a:off x="5420735" y="1622656"/>
+                    <a:off x="5345953" y="1602826"/>
                     <a:ext cx="1273482" cy="480571"/>
                   </a:xfrm>
                   <a:prstGeom prst="rect">
@@ -7794,7 +7794,7 @@
                 </p:nvSpPr>
                 <p:spPr>
                   <a:xfrm>
-                    <a:off x="7414161" y="5615074"/>
+                    <a:off x="6975435" y="5206596"/>
                     <a:ext cx="468301" cy="425758"/>
                   </a:xfrm>
                   <a:prstGeom prst="rect">
@@ -8303,14 +8303,14 @@
                     <a:avLst/>
                   </a:prstGeom>
                   <a:noFill/>
-                  <a:ln w="25400" cap="flat">
+                  <a:ln w="12700" cap="flat">
                     <a:solidFill>
                       <a:schemeClr val="tx1"/>
                     </a:solidFill>
                     <a:prstDash val="solid"/>
                     <a:miter lim="400000"/>
-                    <a:headEnd type="triangle" w="lg" len="med"/>
-                    <a:tailEnd type="triangle" w="lg" len="med"/>
+                    <a:headEnd type="stealth" w="lg" len="med"/>
+                    <a:tailEnd type="stealth" w="lg" len="med"/>
                   </a:ln>
                   <a:effectLst/>
                 </p:spPr>
@@ -8343,8 +8343,8 @@
                 </p:nvCxnSpPr>
                 <p:spPr>
                   <a:xfrm flipV="1">
-                    <a:off x="2272414" y="4152958"/>
-                    <a:ext cx="310608" cy="6638"/>
+                    <a:off x="2305769" y="4152958"/>
+                    <a:ext cx="277253" cy="251"/>
                   </a:xfrm>
                   <a:prstGeom prst="straightConnector1">
                     <a:avLst/>
@@ -8356,8 +8356,8 @@
                     </a:solidFill>
                     <a:prstDash val="solid"/>
                     <a:miter lim="400000"/>
-                    <a:headEnd type="triangle" w="lg" len="med"/>
-                    <a:tailEnd type="triangle" w="lg" len="med"/>
+                    <a:headEnd type="stealth" w="lg" len="med"/>
+                    <a:tailEnd type="stealth" w="lg" len="med"/>
                   </a:ln>
                   <a:effectLst/>
                 </p:spPr>
@@ -8388,10 +8388,10 @@
                 </p:nvGrpSpPr>
                 <p:grpSpPr>
                   <a:xfrm>
-                    <a:off x="1734839" y="3855014"/>
-                    <a:ext cx="661160" cy="930851"/>
-                    <a:chOff x="1705385" y="3661831"/>
-                    <a:chExt cx="661160" cy="930851"/>
+                    <a:off x="1733999" y="3855014"/>
+                    <a:ext cx="661160" cy="960437"/>
+                    <a:chOff x="1704545" y="3661831"/>
+                    <a:chExt cx="661160" cy="960437"/>
                   </a:xfrm>
                 </p:grpSpPr>
                 <p:sp>
@@ -8408,7 +8408,7 @@
                   </p:nvSpPr>
                   <p:spPr>
                     <a:xfrm>
-                      <a:off x="1705385" y="4151536"/>
+                      <a:off x="1704545" y="4181122"/>
                       <a:ext cx="661160" cy="441146"/>
                     </a:xfrm>
                     <a:prstGeom prst="rect">
@@ -8799,14 +8799,14 @@
                 </p:nvCxnSpPr>
                 <p:spPr>
                   <a:xfrm>
-                    <a:off x="3722145" y="5659705"/>
-                    <a:ext cx="7529" cy="356119"/>
+                    <a:off x="3729674" y="5655164"/>
+                    <a:ext cx="0" cy="360660"/>
                   </a:xfrm>
                   <a:prstGeom prst="straightConnector1">
                     <a:avLst/>
                   </a:prstGeom>
                   <a:noFill/>
-                  <a:ln w="25400" cap="flat">
+                  <a:ln w="12700" cap="flat">
                     <a:solidFill>
                       <a:schemeClr val="tx1"/>
                     </a:solidFill>
@@ -8853,7 +8853,7 @@
                     <a:avLst/>
                   </a:prstGeom>
                   <a:noFill/>
-                  <a:ln w="25400" cap="flat">
+                  <a:ln w="12700" cap="flat">
                     <a:solidFill>
                       <a:schemeClr val="tx1"/>
                     </a:solidFill>
@@ -8900,7 +8900,7 @@
                     <a:avLst/>
                   </a:prstGeom>
                   <a:noFill/>
-                  <a:ln w="22225" cap="flat">
+                  <a:ln w="12700" cap="flat">
                     <a:solidFill>
                       <a:schemeClr val="tx1"/>
                     </a:solidFill>
@@ -8947,7 +8947,7 @@
                     <a:avLst/>
                   </a:prstGeom>
                   <a:noFill/>
-                  <a:ln w="25400" cap="flat">
+                  <a:ln w="12700" cap="flat">
                     <a:solidFill>
                       <a:schemeClr val="tx1"/>
                     </a:solidFill>
@@ -8987,21 +8987,21 @@
                 </p:nvCxnSpPr>
                 <p:spPr>
                   <a:xfrm flipV="1">
-                    <a:off x="6883807" y="6553448"/>
-                    <a:ext cx="506132" cy="827"/>
+                    <a:off x="6884821" y="6392341"/>
+                    <a:ext cx="571195" cy="1"/>
                   </a:xfrm>
                   <a:prstGeom prst="straightConnector1">
                     <a:avLst/>
                   </a:prstGeom>
                   <a:noFill/>
-                  <a:ln w="25400" cap="flat">
+                  <a:ln w="12700" cap="flat">
                     <a:solidFill>
                       <a:schemeClr val="tx1"/>
                     </a:solidFill>
                     <a:prstDash val="solid"/>
                     <a:miter lim="400000"/>
-                    <a:headEnd type="triangle" w="lg" len="med"/>
-                    <a:tailEnd type="triangle" w="lg" len="med"/>
+                    <a:headEnd type="stealth" w="lg" len="med"/>
+                    <a:tailEnd type="stealth" w="lg" len="med"/>
                   </a:ln>
                   <a:effectLst/>
                 </p:spPr>
@@ -9032,7 +9032,7 @@
                 </p:nvSpPr>
                 <p:spPr>
                   <a:xfrm>
-                    <a:off x="7184819" y="6748618"/>
+                    <a:off x="7175572" y="6580162"/>
                     <a:ext cx="965542" cy="480571"/>
                   </a:xfrm>
                   <a:prstGeom prst="rect">
@@ -9164,7 +9164,7 @@
                 </p:nvSpPr>
                 <p:spPr>
                   <a:xfrm>
-                    <a:off x="7313439" y="1180492"/>
+                    <a:off x="7271688" y="1156144"/>
                     <a:ext cx="1206299" cy="471924"/>
                   </a:xfrm>
                   <a:prstGeom prst="rect">
@@ -9746,8 +9746,8 @@
                 </p:nvSpPr>
                 <p:spPr>
                   <a:xfrm>
-                    <a:off x="7579456" y="1620691"/>
-                    <a:ext cx="642017" cy="471924"/>
+                    <a:off x="7472322" y="1612347"/>
+                    <a:ext cx="860668" cy="471924"/>
                   </a:xfrm>
                   <a:prstGeom prst="rect">
                     <a:avLst/>
@@ -9796,7 +9796,7 @@
                         <a:latin typeface="Helvetica" panose="020B0604020202020204" pitchFamily="34" charset="0"/>
                         <a:cs typeface="Helvetica" panose="020B0604020202020204" pitchFamily="34" charset="0"/>
                       </a:rPr>
-                      <a:t>DC</a:t>
+                      <a:t>Datacenter</a:t>
                     </a:r>
                     <a:endParaRPr sz="1200" dirty="0">
                       <a:latin typeface="Helvetica" panose="020B0604020202020204" pitchFamily="34" charset="0"/>
@@ -9827,8 +9827,8 @@
                 </p:blipFill>
                 <p:spPr>
                   <a:xfrm>
-                    <a:off x="7047118" y="1206740"/>
-                    <a:ext cx="411691" cy="377383"/>
+                    <a:off x="7047119" y="1206741"/>
+                    <a:ext cx="351557" cy="322260"/>
                   </a:xfrm>
                   <a:prstGeom prst="rect">
                     <a:avLst/>
@@ -9856,7 +9856,7 @@
                     <a:avLst/>
                   </a:prstGeom>
                   <a:noFill/>
-                  <a:ln w="25400" cap="flat">
+                  <a:ln w="12700" cap="flat">
                     <a:solidFill>
                       <a:schemeClr val="tx1"/>
                     </a:solidFill>
@@ -9931,14 +9931,14 @@
                 </p:nvCxnSpPr>
                 <p:spPr>
                   <a:xfrm>
-                    <a:off x="3715523" y="2927611"/>
-                    <a:ext cx="0" cy="1401417"/>
+                    <a:off x="3715523" y="2890456"/>
+                    <a:ext cx="0" cy="1438572"/>
                   </a:xfrm>
                   <a:prstGeom prst="straightConnector1">
                     <a:avLst/>
                   </a:prstGeom>
                   <a:noFill/>
-                  <a:ln w="25400" cap="flat">
+                  <a:ln w="12700" cap="flat">
                     <a:solidFill>
                       <a:schemeClr val="tx1"/>
                     </a:solidFill>
@@ -9985,7 +9985,7 @@
                     <a:avLst/>
                   </a:prstGeom>
                   <a:noFill/>
-                  <a:ln w="25400" cap="flat">
+                  <a:ln w="12700" cap="flat">
                     <a:solidFill>
                       <a:schemeClr val="tx1"/>
                     </a:solidFill>
@@ -10023,10 +10023,10 @@
                 </p:nvGrpSpPr>
                 <p:grpSpPr>
                   <a:xfrm>
-                    <a:off x="1520451" y="1143287"/>
-                    <a:ext cx="5331927" cy="6143771"/>
-                    <a:chOff x="1490997" y="950104"/>
-                    <a:chExt cx="5331927" cy="6143771"/>
+                    <a:off x="1520451" y="1163707"/>
+                    <a:ext cx="5331927" cy="6123351"/>
+                    <a:chOff x="1490997" y="970524"/>
+                    <a:chExt cx="5331927" cy="6123351"/>
                   </a:xfrm>
                 </p:grpSpPr>
                 <p:sp>
@@ -10114,7 +10114,7 @@
                   </p:nvSpPr>
                   <p:spPr>
                     <a:xfrm>
-                      <a:off x="1950003" y="950104"/>
+                      <a:off x="1869919" y="970524"/>
                       <a:ext cx="2070903" cy="292521"/>
                     </a:xfrm>
                     <a:prstGeom prst="rect">
@@ -10183,8 +10183,8 @@
                   </p:blipFill>
                   <p:spPr>
                     <a:xfrm>
-                      <a:off x="1523637" y="1005504"/>
-                      <a:ext cx="394417" cy="361549"/>
+                      <a:off x="1523638" y="1005504"/>
+                      <a:ext cx="358814" cy="328913"/>
                     </a:xfrm>
                     <a:prstGeom prst="rect">
                       <a:avLst/>
@@ -10223,8 +10223,8 @@
                 </p:blipFill>
                 <p:spPr>
                   <a:xfrm>
-                    <a:off x="1693008" y="1666972"/>
-                    <a:ext cx="464670" cy="399498"/>
+                    <a:off x="1679662" y="1686296"/>
+                    <a:ext cx="418479" cy="359785"/>
                   </a:xfrm>
                   <a:prstGeom prst="rect">
                     <a:avLst/>
@@ -10263,7 +10263,7 @@
                 <p:spPr>
                   <a:xfrm>
                     <a:off x="4982613" y="1650659"/>
-                    <a:ext cx="464670" cy="399498"/>
+                    <a:ext cx="407407" cy="350266"/>
                   </a:xfrm>
                   <a:prstGeom prst="rect">
                     <a:avLst/>
@@ -10301,8 +10301,8 @@
                 </p:blipFill>
                 <p:spPr>
                   <a:xfrm>
-                    <a:off x="7163993" y="1675773"/>
-                    <a:ext cx="464670" cy="399498"/>
+                    <a:off x="7142743" y="1665909"/>
+                    <a:ext cx="389669" cy="335016"/>
                   </a:xfrm>
                   <a:prstGeom prst="rect">
                     <a:avLst/>
@@ -10471,26 +10471,27 @@
                   </p:cNvPr>
                   <p:cNvCxnSpPr>
                     <a:cxnSpLocks/>
+                    <a:stCxn id="273" idx="2"/>
                   </p:cNvCxnSpPr>
                   <p:nvPr/>
                 </p:nvCxnSpPr>
                 <p:spPr>
-                  <a:xfrm>
-                    <a:off x="7635170" y="4801551"/>
-                    <a:ext cx="3025" cy="365298"/>
+                  <a:xfrm flipH="1">
+                    <a:off x="7680695" y="4734672"/>
+                    <a:ext cx="6256" cy="427873"/>
                   </a:xfrm>
                   <a:prstGeom prst="straightConnector1">
                     <a:avLst/>
                   </a:prstGeom>
                   <a:noFill/>
-                  <a:ln w="25400" cap="flat">
+                  <a:ln w="12700" cap="flat">
                     <a:solidFill>
                       <a:schemeClr val="tx1"/>
                     </a:solidFill>
                     <a:prstDash val="solid"/>
                     <a:miter lim="400000"/>
-                    <a:headEnd type="triangle" w="lg" len="med"/>
-                    <a:tailEnd type="triangle" w="lg" len="med"/>
+                    <a:headEnd type="stealth" w="lg" len="med"/>
+                    <a:tailEnd type="stealth" w="lg" len="med"/>
                   </a:ln>
                   <a:effectLst/>
                 </p:spPr>
@@ -10523,7 +10524,7 @@
               <p:spPr>
                 <a:xfrm>
                   <a:off x="8755424" y="157051"/>
-                  <a:ext cx="1231896" cy="7402690"/>
+                  <a:ext cx="1231896" cy="7415654"/>
                 </a:xfrm>
                 <a:prstGeom prst="roundRect">
                   <a:avLst>
@@ -10531,7 +10532,7 @@
                   </a:avLst>
                 </a:prstGeom>
                 <a:noFill/>
-                <a:ln w="25400">
+                <a:ln w="38100">
                   <a:solidFill>
                     <a:srgbClr val="4378BB"/>
                   </a:solidFill>
@@ -10602,23 +10603,23 @@
               </p:nvCxnSpPr>
               <p:spPr>
                 <a:xfrm rot="10800000">
-                  <a:off x="993593" y="3190969"/>
-                  <a:ext cx="1478981" cy="412590"/>
+                  <a:off x="991390" y="3090267"/>
+                  <a:ext cx="1658552" cy="511422"/>
                 </a:xfrm>
                 <a:prstGeom prst="bentConnector3">
                   <a:avLst>
-                    <a:gd name="adj1" fmla="val 85329"/>
+                    <a:gd name="adj1" fmla="val 86121"/>
                   </a:avLst>
                 </a:prstGeom>
                 <a:noFill/>
-                <a:ln w="25400" cap="flat">
+                <a:ln w="12700" cap="flat">
                   <a:solidFill>
                     <a:schemeClr val="tx1"/>
                   </a:solidFill>
                   <a:prstDash val="solid"/>
                   <a:miter lim="400000"/>
-                  <a:headEnd type="triangle" w="lg" len="med"/>
-                  <a:tailEnd type="triangle" w="lg" len="med"/>
+                  <a:headEnd type="stealth" w="lg" len="med"/>
+                  <a:tailEnd type="stealth" w="lg" len="med"/>
                 </a:ln>
                 <a:effectLst/>
               </p:spPr>
@@ -10658,14 +10659,14 @@
                   <a:avLst/>
                 </a:prstGeom>
                 <a:noFill/>
-                <a:ln w="25400" cap="flat">
+                <a:ln w="12700" cap="flat">
                   <a:solidFill>
                     <a:schemeClr val="tx1"/>
                   </a:solidFill>
                   <a:prstDash val="solid"/>
                   <a:miter lim="400000"/>
-                  <a:headEnd type="triangle" w="lg" len="med"/>
-                  <a:tailEnd type="triangle" w="lg" len="med"/>
+                  <a:headEnd type="stealth" w="lg" len="med"/>
+                  <a:tailEnd type="stealth" w="lg" len="med"/>
                 </a:ln>
                 <a:effectLst/>
               </p:spPr>
@@ -10697,9 +10698,9 @@
                 <p:nvPr/>
               </p:nvCxnSpPr>
               <p:spPr>
-                <a:xfrm>
-                  <a:off x="991780" y="2954918"/>
-                  <a:ext cx="979881" cy="4808"/>
+                <a:xfrm flipV="1">
+                  <a:off x="991780" y="2952383"/>
+                  <a:ext cx="922143" cy="2535"/>
                 </a:xfrm>
                 <a:prstGeom prst="bentConnector3">
                   <a:avLst>
@@ -10707,13 +10708,13 @@
                   </a:avLst>
                 </a:prstGeom>
                 <a:noFill/>
-                <a:ln w="25400" cap="flat">
+                <a:ln w="12700" cap="flat">
                   <a:solidFill>
                     <a:schemeClr val="tx1"/>
                   </a:solidFill>
                   <a:prstDash val="solid"/>
                   <a:miter lim="400000"/>
-                  <a:headEnd type="triangle" w="lg" len="med"/>
+                  <a:headEnd type="stealth" w="lg" len="med"/>
                   <a:tailEnd type="none"/>
                 </a:ln>
                 <a:effectLst/>
@@ -10756,14 +10757,14 @@
                   </a:avLst>
                 </a:prstGeom>
                 <a:noFill/>
-                <a:ln w="25400" cap="flat">
+                <a:ln w="12700" cap="flat">
                   <a:solidFill>
                     <a:schemeClr val="tx1"/>
                   </a:solidFill>
                   <a:prstDash val="solid"/>
                   <a:miter lim="400000"/>
-                  <a:headEnd type="triangle" w="lg" len="med"/>
-                  <a:tailEnd type="triangle" w="lg" len="med"/>
+                  <a:headEnd type="stealth" w="lg" len="med"/>
+                  <a:tailEnd type="stealth" w="lg" len="med"/>
                 </a:ln>
                 <a:effectLst/>
               </p:spPr>
@@ -13139,8 +13140,8 @@
         </p:blipFill>
         <p:spPr>
           <a:xfrm rot="10800000">
-            <a:off x="2459216" y="3508502"/>
-            <a:ext cx="626063" cy="233354"/>
+            <a:off x="2636585" y="3539487"/>
+            <a:ext cx="449770" cy="167644"/>
           </a:xfrm>
           <a:prstGeom prst="rect">
             <a:avLst/>
@@ -13161,7 +13162,7 @@
         </p:nvGrpSpPr>
         <p:grpSpPr>
           <a:xfrm>
-            <a:off x="7512300" y="6394086"/>
+            <a:off x="7531660" y="6227494"/>
             <a:ext cx="457200" cy="457200"/>
             <a:chOff x="7776669" y="5031984"/>
             <a:chExt cx="751660" cy="692612"/>
@@ -13305,7 +13306,7 @@
         </p:nvGrpSpPr>
         <p:grpSpPr>
           <a:xfrm>
-            <a:off x="7501636" y="5251227"/>
+            <a:off x="7544671" y="5256265"/>
             <a:ext cx="457200" cy="457200"/>
             <a:chOff x="6725138" y="4678386"/>
             <a:chExt cx="704088" cy="704088"/>
@@ -13435,10 +13436,10 @@
       </p:grpSp>
       <p:grpSp>
         <p:nvGrpSpPr>
-          <p:cNvPr id="285" name="Group 284">
+          <p:cNvPr id="283" name="Group 282">
             <a:extLst>
               <a:ext uri="{FF2B5EF4-FFF2-40B4-BE49-F238E27FC236}">
-                <a16:creationId xmlns:a16="http://schemas.microsoft.com/office/drawing/2014/main" id="{992FA4A6-FDE5-824D-9348-E7C18B1FBF32}"/>
+                <a16:creationId xmlns:a16="http://schemas.microsoft.com/office/drawing/2014/main" id="{B6A5E53D-030C-C749-A7F9-A2F913EF70E5}"/>
               </a:ext>
             </a:extLst>
           </p:cNvPr>
@@ -13447,7 +13448,7 @@
         </p:nvGrpSpPr>
         <p:grpSpPr>
           <a:xfrm>
-            <a:off x="442687" y="3991269"/>
+            <a:off x="448431" y="3979194"/>
             <a:ext cx="457200" cy="457200"/>
             <a:chOff x="580179" y="4674410"/>
             <a:chExt cx="704088" cy="704088"/>
@@ -13455,10 +13456,10 @@
         </p:grpSpPr>
         <p:sp>
           <p:nvSpPr>
-            <p:cNvPr id="296" name="Shape 252">
+            <p:cNvPr id="291" name="Shape 252">
               <a:extLst>
                 <a:ext uri="{FF2B5EF4-FFF2-40B4-BE49-F238E27FC236}">
-                  <a16:creationId xmlns:a16="http://schemas.microsoft.com/office/drawing/2014/main" id="{D001D50A-B005-C94E-BBDE-73F146DDFDC0}"/>
+                  <a16:creationId xmlns:a16="http://schemas.microsoft.com/office/drawing/2014/main" id="{DDB1E5E7-4EE5-B34A-B9C3-711181C554A8}"/>
                 </a:ext>
               </a:extLst>
             </p:cNvPr>
@@ -13540,16 +13541,16 @@
                   </a:solidFill>
                 </a:defRPr>
               </a:pPr>
-              <a:endParaRPr sz="1588" dirty="0"/>
+              <a:endParaRPr dirty="0"/>
             </a:p>
           </p:txBody>
         </p:sp>
         <p:pic>
           <p:nvPicPr>
-            <p:cNvPr id="289" name="Picture 288">
+            <p:cNvPr id="297" name="Picture 296">
               <a:extLst>
                 <a:ext uri="{FF2B5EF4-FFF2-40B4-BE49-F238E27FC236}">
-                  <a16:creationId xmlns:a16="http://schemas.microsoft.com/office/drawing/2014/main" id="{73A5D0C1-5B56-F340-B135-3E423246778D}"/>
+                  <a16:creationId xmlns:a16="http://schemas.microsoft.com/office/drawing/2014/main" id="{E0F0B6D8-0A6F-664C-B635-38D3B05F1740}"/>
                 </a:ext>
               </a:extLst>
             </p:cNvPr>
@@ -13566,8 +13567,8 @@
           </p:blipFill>
           <p:spPr>
             <a:xfrm>
-              <a:off x="645746" y="4772091"/>
-              <a:ext cx="572954" cy="462060"/>
+              <a:off x="615321" y="4826000"/>
+              <a:ext cx="633804" cy="450850"/>
             </a:xfrm>
             <a:prstGeom prst="rect">
               <a:avLst/>

</xml_diff>